<commit_message>
FEATURE: Code comments and code coverage
</commit_message>
<xml_diff>
--- a/doc/Coordinated approach to design and testing (WinBlast CapTeam version).pptx
+++ b/doc/Coordinated approach to design and testing (WinBlast CapTeam version).pptx
@@ -20,9 +20,9 @@
     <p:sldId id="270" r:id="rId11"/>
     <p:sldId id="269" r:id="rId12"/>
     <p:sldId id="271" r:id="rId13"/>
-    <p:sldId id="272" r:id="rId14"/>
-    <p:sldId id="279" r:id="rId15"/>
-    <p:sldId id="280" r:id="rId16"/>
+    <p:sldId id="279" r:id="rId14"/>
+    <p:sldId id="280" r:id="rId15"/>
+    <p:sldId id="272" r:id="rId16"/>
     <p:sldId id="273" r:id="rId17"/>
     <p:sldId id="274" r:id="rId18"/>
     <p:sldId id="275" r:id="rId19"/>
@@ -214,7 +214,7 @@
           <a:p>
             <a:fld id="{A251FF5B-A924-41B5-BEC0-3B518AB62F42}" type="datetimeFigureOut">
               <a:rPr lang="en-US" smtClean="0"/>
-              <a:t>5/4/2021</a:t>
+              <a:t>5/5/2021</a:t>
             </a:fld>
             <a:endParaRPr lang="en-US"/>
           </a:p>
@@ -1460,7 +1460,7 @@
           <a:p>
             <a:fld id="{45A16EE6-7E6A-4542-B9E8-1CC72818C7AE}" type="datetimeFigureOut">
               <a:rPr lang="en-US" smtClean="0"/>
-              <a:t>5/4/2021</a:t>
+              <a:t>5/5/2021</a:t>
             </a:fld>
             <a:endParaRPr lang="en-US"/>
           </a:p>
@@ -1630,7 +1630,7 @@
           <a:p>
             <a:fld id="{45A16EE6-7E6A-4542-B9E8-1CC72818C7AE}" type="datetimeFigureOut">
               <a:rPr lang="en-US" smtClean="0"/>
-              <a:t>5/4/2021</a:t>
+              <a:t>5/5/2021</a:t>
             </a:fld>
             <a:endParaRPr lang="en-US"/>
           </a:p>
@@ -1810,7 +1810,7 @@
           <a:p>
             <a:fld id="{45A16EE6-7E6A-4542-B9E8-1CC72818C7AE}" type="datetimeFigureOut">
               <a:rPr lang="en-US" smtClean="0"/>
-              <a:t>5/4/2021</a:t>
+              <a:t>5/5/2021</a:t>
             </a:fld>
             <a:endParaRPr lang="en-US"/>
           </a:p>
@@ -1980,7 +1980,7 @@
           <a:p>
             <a:fld id="{45A16EE6-7E6A-4542-B9E8-1CC72818C7AE}" type="datetimeFigureOut">
               <a:rPr lang="en-US" smtClean="0"/>
-              <a:t>5/4/2021</a:t>
+              <a:t>5/5/2021</a:t>
             </a:fld>
             <a:endParaRPr lang="en-US"/>
           </a:p>
@@ -2226,7 +2226,7 @@
           <a:p>
             <a:fld id="{45A16EE6-7E6A-4542-B9E8-1CC72818C7AE}" type="datetimeFigureOut">
               <a:rPr lang="en-US" smtClean="0"/>
-              <a:t>5/4/2021</a:t>
+              <a:t>5/5/2021</a:t>
             </a:fld>
             <a:endParaRPr lang="en-US"/>
           </a:p>
@@ -2458,7 +2458,7 @@
           <a:p>
             <a:fld id="{45A16EE6-7E6A-4542-B9E8-1CC72818C7AE}" type="datetimeFigureOut">
               <a:rPr lang="en-US" smtClean="0"/>
-              <a:t>5/4/2021</a:t>
+              <a:t>5/5/2021</a:t>
             </a:fld>
             <a:endParaRPr lang="en-US"/>
           </a:p>
@@ -2825,7 +2825,7 @@
           <a:p>
             <a:fld id="{45A16EE6-7E6A-4542-B9E8-1CC72818C7AE}" type="datetimeFigureOut">
               <a:rPr lang="en-US" smtClean="0"/>
-              <a:t>5/4/2021</a:t>
+              <a:t>5/5/2021</a:t>
             </a:fld>
             <a:endParaRPr lang="en-US"/>
           </a:p>
@@ -2943,7 +2943,7 @@
           <a:p>
             <a:fld id="{45A16EE6-7E6A-4542-B9E8-1CC72818C7AE}" type="datetimeFigureOut">
               <a:rPr lang="en-US" smtClean="0"/>
-              <a:t>5/4/2021</a:t>
+              <a:t>5/5/2021</a:t>
             </a:fld>
             <a:endParaRPr lang="en-US"/>
           </a:p>
@@ -3038,7 +3038,7 @@
           <a:p>
             <a:fld id="{45A16EE6-7E6A-4542-B9E8-1CC72818C7AE}" type="datetimeFigureOut">
               <a:rPr lang="en-US" smtClean="0"/>
-              <a:t>5/4/2021</a:t>
+              <a:t>5/5/2021</a:t>
             </a:fld>
             <a:endParaRPr lang="en-US"/>
           </a:p>
@@ -3315,7 +3315,7 @@
           <a:p>
             <a:fld id="{45A16EE6-7E6A-4542-B9E8-1CC72818C7AE}" type="datetimeFigureOut">
               <a:rPr lang="en-US" smtClean="0"/>
-              <a:t>5/4/2021</a:t>
+              <a:t>5/5/2021</a:t>
             </a:fld>
             <a:endParaRPr lang="en-US"/>
           </a:p>
@@ -3568,7 +3568,7 @@
           <a:p>
             <a:fld id="{45A16EE6-7E6A-4542-B9E8-1CC72818C7AE}" type="datetimeFigureOut">
               <a:rPr lang="en-US" smtClean="0"/>
-              <a:t>5/4/2021</a:t>
+              <a:t>5/5/2021</a:t>
             </a:fld>
             <a:endParaRPr lang="en-US"/>
           </a:p>
@@ -3781,7 +3781,7 @@
           <a:p>
             <a:fld id="{45A16EE6-7E6A-4542-B9E8-1CC72818C7AE}" type="datetimeFigureOut">
               <a:rPr lang="en-US" smtClean="0"/>
-              <a:t>5/4/2021</a:t>
+              <a:t>5/5/2021</a:t>
             </a:fld>
             <a:endParaRPr lang="en-US"/>
           </a:p>
@@ -4208,7 +4208,15 @@
           <a:p>
             <a:r>
               <a:rPr lang="en-US" dirty="0" smtClean="0"/>
-              <a:t>A coordinated approach to testing</a:t>
+              <a:t>A </a:t>
+            </a:r>
+            <a:r>
+              <a:rPr lang="en-US" dirty="0" smtClean="0"/>
+              <a:t>balanced </a:t>
+            </a:r>
+            <a:r>
+              <a:rPr lang="en-US" dirty="0" smtClean="0"/>
+              <a:t>approach to testing</a:t>
             </a:r>
             <a:endParaRPr lang="en-US" dirty="0"/>
           </a:p>
@@ -4239,16 +4247,13 @@
             <a:pPr lvl="0"/>
             <a:r>
               <a:rPr lang="en-US" baseline="0" dirty="0" smtClean="0"/>
-              <a:t>Nov</a:t>
-            </a:r>
-            <a:r>
-              <a:rPr lang="en-US" dirty="0" smtClean="0"/>
-              <a:t> 8</a:t>
-            </a:r>
-            <a:r>
-              <a:rPr lang="en-US" baseline="0" dirty="0" smtClean="0"/>
-              <a:t>, 2016</a:t>
-            </a:r>
+              <a:t>May 6,</a:t>
+            </a:r>
+            <a:r>
+              <a:rPr lang="en-US" dirty="0" smtClean="0"/>
+              <a:t> 2021</a:t>
+            </a:r>
+            <a:endParaRPr lang="en-US" baseline="0" dirty="0" smtClean="0"/>
           </a:p>
         </p:txBody>
       </p:sp>
@@ -5915,6 +5920,593 @@
 </file>
 
 <file path=ppt/slides/slide13.xml><?xml version="1.0" encoding="utf-8"?>
+<p:sld xmlns:a="http://schemas.openxmlformats.org/drawingml/2006/main" xmlns:r="http://schemas.openxmlformats.org/officeDocument/2006/relationships" xmlns:p="http://schemas.openxmlformats.org/presentationml/2006/main">
+  <p:cSld>
+    <p:spTree>
+      <p:nvGrpSpPr>
+        <p:cNvPr id="1" name=""/>
+        <p:cNvGrpSpPr/>
+        <p:nvPr/>
+      </p:nvGrpSpPr>
+      <p:grpSpPr>
+        <a:xfrm>
+          <a:off x="0" y="0"/>
+          <a:ext cx="0" cy="0"/>
+          <a:chOff x="0" y="0"/>
+          <a:chExt cx="0" cy="0"/>
+        </a:xfrm>
+      </p:grpSpPr>
+      <p:sp>
+        <p:nvSpPr>
+          <p:cNvPr id="2" name="Title 1"/>
+          <p:cNvSpPr>
+            <a:spLocks noGrp="1"/>
+          </p:cNvSpPr>
+          <p:nvPr>
+            <p:ph type="title"/>
+          </p:nvPr>
+        </p:nvSpPr>
+        <p:spPr>
+          <a:xfrm>
+            <a:off x="469500" y="141650"/>
+            <a:ext cx="7805256" cy="1325563"/>
+          </a:xfrm>
+        </p:spPr>
+        <p:txBody>
+          <a:bodyPr/>
+          <a:lstStyle/>
+          <a:p>
+            <a:r>
+              <a:rPr lang="en-US" dirty="0" smtClean="0"/>
+              <a:t>Background …</a:t>
+            </a:r>
+            <a:endParaRPr lang="en-US" dirty="0"/>
+          </a:p>
+        </p:txBody>
+      </p:sp>
+      <p:sp>
+        <p:nvSpPr>
+          <p:cNvPr id="17" name="TextBox 16"/>
+          <p:cNvSpPr txBox="1"/>
+          <p:nvPr/>
+        </p:nvSpPr>
+        <p:spPr>
+          <a:xfrm>
+            <a:off x="469500" y="1256831"/>
+            <a:ext cx="4357333" cy="523220"/>
+          </a:xfrm>
+          <a:prstGeom prst="rect">
+            <a:avLst/>
+          </a:prstGeom>
+          <a:noFill/>
+        </p:spPr>
+        <p:txBody>
+          <a:bodyPr wrap="square" rtlCol="0">
+            <a:spAutoFit/>
+          </a:bodyPr>
+          <a:lstStyle/>
+          <a:p>
+            <a:r>
+              <a:rPr lang="en-US" sz="2800" u="sng" dirty="0" smtClean="0"/>
+              <a:t>What’s </a:t>
+            </a:r>
+            <a:r>
+              <a:rPr lang="en-US" sz="2800" u="sng" dirty="0" smtClean="0"/>
+              <a:t>test </a:t>
+            </a:r>
+            <a:r>
+              <a:rPr lang="en-US" sz="2800" u="sng" dirty="0" smtClean="0"/>
+              <a:t>coverage?</a:t>
+            </a:r>
+            <a:endParaRPr lang="en-US" sz="2800" u="sng" dirty="0"/>
+          </a:p>
+        </p:txBody>
+      </p:sp>
+      <p:sp>
+        <p:nvSpPr>
+          <p:cNvPr id="14" name="Content Placeholder 2"/>
+          <p:cNvSpPr>
+            <a:spLocks noGrp="1"/>
+          </p:cNvSpPr>
+          <p:nvPr>
+            <p:ph idx="1"/>
+          </p:nvPr>
+        </p:nvSpPr>
+        <p:spPr>
+          <a:xfrm>
+            <a:off x="469501" y="1780051"/>
+            <a:ext cx="11510690" cy="4853224"/>
+          </a:xfrm>
+        </p:spPr>
+        <p:txBody>
+          <a:bodyPr>
+            <a:normAutofit fontScale="92500" lnSpcReduction="10000"/>
+          </a:bodyPr>
+          <a:lstStyle/>
+          <a:p>
+            <a:pPr marL="342833" indent="-342833">
+              <a:spcBef>
+                <a:spcPct val="20000"/>
+              </a:spcBef>
+              <a:buFont typeface="Wingdings" pitchFamily="2" charset="2"/>
+              <a:buChar char="ü"/>
+            </a:pPr>
+            <a:r>
+              <a:rPr lang="en-US" dirty="0" smtClean="0"/>
+              <a:t>Test </a:t>
+            </a:r>
+            <a:r>
+              <a:rPr lang="en-US" dirty="0"/>
+              <a:t>coverage is the percentage of code branches in each subroutine that have been tested. </a:t>
+            </a:r>
+          </a:p>
+          <a:p>
+            <a:pPr marL="800010" lvl="1" indent="-342900">
+              <a:spcBef>
+                <a:spcPct val="20000"/>
+              </a:spcBef>
+            </a:pPr>
+            <a:r>
+              <a:rPr lang="en-US" dirty="0"/>
+              <a:t>Coverage information is highly valuable to </a:t>
+            </a:r>
+            <a:r>
+              <a:rPr lang="en-US" dirty="0" smtClean="0"/>
+              <a:t>an approval authority </a:t>
+            </a:r>
+            <a:r>
+              <a:rPr lang="en-US" dirty="0"/>
+              <a:t>who needs to know if all the parts of the code that will be </a:t>
+            </a:r>
+            <a:r>
+              <a:rPr lang="en-US" dirty="0" smtClean="0"/>
+              <a:t>approved have </a:t>
+            </a:r>
+            <a:r>
+              <a:rPr lang="en-US" dirty="0"/>
+              <a:t>been exercised.</a:t>
+            </a:r>
+          </a:p>
+          <a:p>
+            <a:pPr marL="800010" lvl="1" indent="-342900">
+              <a:spcBef>
+                <a:spcPct val="20000"/>
+              </a:spcBef>
+            </a:pPr>
+            <a:r>
+              <a:rPr lang="en-US" dirty="0" smtClean="0"/>
+              <a:t>100% </a:t>
+            </a:r>
+            <a:r>
+              <a:rPr lang="en-US" dirty="0" smtClean="0"/>
+              <a:t>test </a:t>
+            </a:r>
+            <a:r>
+              <a:rPr lang="en-US" dirty="0" smtClean="0"/>
+              <a:t>coverage is ideal but often unachievable due to resource limitations. </a:t>
+            </a:r>
+          </a:p>
+          <a:p>
+            <a:pPr marL="800010" lvl="1" indent="-342900">
+              <a:spcBef>
+                <a:spcPct val="20000"/>
+              </a:spcBef>
+            </a:pPr>
+            <a:r>
+              <a:rPr lang="en-US" dirty="0" smtClean="0"/>
+              <a:t>Capability team needs to decide what percentage of coverage they will reasonably achieve.</a:t>
+            </a:r>
+            <a:endParaRPr lang="en-US" dirty="0"/>
+          </a:p>
+          <a:p>
+            <a:pPr marL="342833" indent="-342833">
+              <a:spcBef>
+                <a:spcPct val="20000"/>
+              </a:spcBef>
+              <a:buFont typeface="Wingdings" pitchFamily="2" charset="2"/>
+              <a:buChar char="ü"/>
+            </a:pPr>
+            <a:r>
+              <a:rPr lang="en-US" dirty="0" smtClean="0"/>
+              <a:t>A </a:t>
+            </a:r>
+            <a:r>
+              <a:rPr lang="en-US" dirty="0"/>
+              <a:t>knowledgeable human in the loop is needed to fully interpret </a:t>
+            </a:r>
+            <a:r>
+              <a:rPr lang="en-US" dirty="0" smtClean="0"/>
+              <a:t>test </a:t>
+            </a:r>
+            <a:r>
+              <a:rPr lang="en-US" dirty="0"/>
+              <a:t>coverage. </a:t>
+            </a:r>
+          </a:p>
+          <a:p>
+            <a:pPr marL="799943" lvl="1" indent="-342833">
+              <a:spcBef>
+                <a:spcPct val="20000"/>
+              </a:spcBef>
+            </a:pPr>
+            <a:r>
+              <a:rPr lang="en-US" dirty="0" smtClean="0"/>
+              <a:t>As one example, </a:t>
+            </a:r>
+            <a:r>
+              <a:rPr lang="en-US" dirty="0"/>
+              <a:t>a model may have one code path to read a file and have a test that calls that code. In this case, </a:t>
+            </a:r>
+            <a:r>
+              <a:rPr lang="en-US" dirty="0" smtClean="0"/>
+              <a:t>a test tool would </a:t>
+            </a:r>
+            <a:r>
+              <a:rPr lang="en-US" dirty="0"/>
+              <a:t>report 100% code coverage.</a:t>
+            </a:r>
+          </a:p>
+          <a:p>
+            <a:pPr marL="799943" lvl="1" indent="-342833">
+              <a:spcBef>
+                <a:spcPct val="20000"/>
+              </a:spcBef>
+            </a:pPr>
+            <a:r>
+              <a:rPr lang="en-US" dirty="0"/>
+              <a:t>However, if the file could not be opened, the model is missing code that would handle the error. Adding one new path for error handling will improve this code, but without a new test written for this case, the improved code will show only 50% code coverage. </a:t>
+            </a:r>
+          </a:p>
+          <a:p>
+            <a:pPr marL="799943" lvl="1" indent="-342833">
+              <a:spcBef>
+                <a:spcPct val="20000"/>
+              </a:spcBef>
+            </a:pPr>
+            <a:r>
+              <a:rPr lang="en-US" dirty="0"/>
+              <a:t>In the above example, the revised 50% code coverage is better than the original 100% coverage because </a:t>
+            </a:r>
+            <a:r>
+              <a:rPr lang="en-US" dirty="0" smtClean="0"/>
+              <a:t>the model is doing a better job at error handling.</a:t>
+            </a:r>
+            <a:endParaRPr lang="en-US" dirty="0"/>
+          </a:p>
+          <a:p>
+            <a:pPr marL="457200" lvl="1" indent="0">
+              <a:buNone/>
+            </a:pPr>
+            <a:endParaRPr lang="en-US" dirty="0"/>
+          </a:p>
+        </p:txBody>
+      </p:sp>
+    </p:spTree>
+    <p:extLst>
+      <p:ext uri="{BB962C8B-B14F-4D97-AF65-F5344CB8AC3E}">
+        <p14:creationId xmlns:p14="http://schemas.microsoft.com/office/powerpoint/2010/main" val="2853291134"/>
+      </p:ext>
+    </p:extLst>
+  </p:cSld>
+  <p:clrMapOvr>
+    <a:masterClrMapping/>
+  </p:clrMapOvr>
+  <p:timing>
+    <p:tnLst>
+      <p:par>
+        <p:cTn id="1" dur="indefinite" restart="never" nodeType="tmRoot"/>
+      </p:par>
+    </p:tnLst>
+  </p:timing>
+</p:sld>
+</file>
+
+<file path=ppt/slides/slide14.xml><?xml version="1.0" encoding="utf-8"?>
+<p:sld xmlns:a="http://schemas.openxmlformats.org/drawingml/2006/main" xmlns:r="http://schemas.openxmlformats.org/officeDocument/2006/relationships" xmlns:p="http://schemas.openxmlformats.org/presentationml/2006/main">
+  <p:cSld>
+    <p:spTree>
+      <p:nvGrpSpPr>
+        <p:cNvPr id="1" name=""/>
+        <p:cNvGrpSpPr/>
+        <p:nvPr/>
+      </p:nvGrpSpPr>
+      <p:grpSpPr>
+        <a:xfrm>
+          <a:off x="0" y="0"/>
+          <a:ext cx="0" cy="0"/>
+          <a:chOff x="0" y="0"/>
+          <a:chExt cx="0" cy="0"/>
+        </a:xfrm>
+      </p:grpSpPr>
+      <p:sp>
+        <p:nvSpPr>
+          <p:cNvPr id="2" name="Title 1"/>
+          <p:cNvSpPr>
+            <a:spLocks noGrp="1"/>
+          </p:cNvSpPr>
+          <p:nvPr>
+            <p:ph type="title"/>
+          </p:nvPr>
+        </p:nvSpPr>
+        <p:spPr>
+          <a:xfrm>
+            <a:off x="469500" y="141650"/>
+            <a:ext cx="7805256" cy="1325563"/>
+          </a:xfrm>
+        </p:spPr>
+        <p:txBody>
+          <a:bodyPr/>
+          <a:lstStyle/>
+          <a:p>
+            <a:r>
+              <a:rPr lang="en-US" dirty="0" smtClean="0"/>
+              <a:t>Background …</a:t>
+            </a:r>
+            <a:endParaRPr lang="en-US" dirty="0"/>
+          </a:p>
+        </p:txBody>
+      </p:sp>
+      <p:sp>
+        <p:nvSpPr>
+          <p:cNvPr id="17" name="TextBox 16"/>
+          <p:cNvSpPr txBox="1"/>
+          <p:nvPr/>
+        </p:nvSpPr>
+        <p:spPr>
+          <a:xfrm>
+            <a:off x="469500" y="1256831"/>
+            <a:ext cx="5757129" cy="523220"/>
+          </a:xfrm>
+          <a:prstGeom prst="rect">
+            <a:avLst/>
+          </a:prstGeom>
+          <a:noFill/>
+        </p:spPr>
+        <p:txBody>
+          <a:bodyPr wrap="square" rtlCol="0">
+            <a:spAutoFit/>
+          </a:bodyPr>
+          <a:lstStyle/>
+          <a:p>
+            <a:r>
+              <a:rPr lang="en-US" sz="2800" u="sng" dirty="0" smtClean="0"/>
+              <a:t>Consistent and correct error handling</a:t>
+            </a:r>
+            <a:endParaRPr lang="en-US" sz="2800" u="sng" dirty="0"/>
+          </a:p>
+        </p:txBody>
+      </p:sp>
+      <p:sp>
+        <p:nvSpPr>
+          <p:cNvPr id="14" name="Content Placeholder 2"/>
+          <p:cNvSpPr>
+            <a:spLocks noGrp="1"/>
+          </p:cNvSpPr>
+          <p:nvPr>
+            <p:ph idx="1"/>
+          </p:nvPr>
+        </p:nvSpPr>
+        <p:spPr>
+          <a:xfrm>
+            <a:off x="469501" y="1780051"/>
+            <a:ext cx="11510690" cy="4853224"/>
+          </a:xfrm>
+        </p:spPr>
+        <p:txBody>
+          <a:bodyPr>
+            <a:normAutofit fontScale="92500" lnSpcReduction="20000"/>
+          </a:bodyPr>
+          <a:lstStyle/>
+          <a:p>
+            <a:pPr marL="342833" indent="-342833">
+              <a:spcBef>
+                <a:spcPct val="20000"/>
+              </a:spcBef>
+              <a:buFont typeface="Wingdings" pitchFamily="2" charset="2"/>
+              <a:buChar char="ü"/>
+            </a:pPr>
+            <a:r>
+              <a:rPr lang="en-US" dirty="0"/>
+              <a:t>Both the </a:t>
+            </a:r>
+            <a:r>
+              <a:rPr lang="en-US" dirty="0" smtClean="0"/>
+              <a:t>capability team and the JEL team must </a:t>
+            </a:r>
+            <a:r>
+              <a:rPr lang="en-US" dirty="0"/>
+              <a:t>know a model’s error handling approach and evaluate whether it’s being followed in order to properly judge a code coverage metric.</a:t>
+            </a:r>
+          </a:p>
+          <a:p>
+            <a:pPr marL="342833" indent="-342833">
+              <a:spcBef>
+                <a:spcPct val="20000"/>
+              </a:spcBef>
+              <a:buFont typeface="Wingdings" pitchFamily="2" charset="2"/>
+              <a:buChar char="ü"/>
+            </a:pPr>
+            <a:r>
+              <a:rPr lang="en-US" dirty="0"/>
+              <a:t>For instance, if the model encounters a problem during its execution, does it:</a:t>
+            </a:r>
+          </a:p>
+          <a:p>
+            <a:pPr marL="800033" lvl="1" indent="-342833">
+              <a:spcBef>
+                <a:spcPct val="20000"/>
+              </a:spcBef>
+              <a:buFont typeface="Wingdings" pitchFamily="2" charset="2"/>
+              <a:buChar char="ü"/>
+            </a:pPr>
+            <a:r>
+              <a:rPr lang="en-US" dirty="0"/>
+              <a:t>Issue a warning?</a:t>
+            </a:r>
+          </a:p>
+          <a:p>
+            <a:pPr marL="800033" lvl="1" indent="-342833">
+              <a:spcBef>
+                <a:spcPct val="20000"/>
+              </a:spcBef>
+              <a:buFont typeface="Wingdings" pitchFamily="2" charset="2"/>
+              <a:buChar char="ü"/>
+            </a:pPr>
+            <a:r>
+              <a:rPr lang="en-US" dirty="0"/>
+              <a:t>Fail immediately?</a:t>
+            </a:r>
+          </a:p>
+          <a:p>
+            <a:pPr marL="800033" lvl="1" indent="-342833">
+              <a:spcBef>
+                <a:spcPct val="20000"/>
+              </a:spcBef>
+              <a:buFont typeface="Wingdings" pitchFamily="2" charset="2"/>
+              <a:buChar char="ü"/>
+            </a:pPr>
+            <a:r>
+              <a:rPr lang="en-US" dirty="0"/>
+              <a:t>Rollback to a previous point?</a:t>
+            </a:r>
+          </a:p>
+          <a:p>
+            <a:pPr marL="800033" lvl="1" indent="-342833">
+              <a:spcBef>
+                <a:spcPct val="20000"/>
+              </a:spcBef>
+              <a:buFont typeface="Wingdings" pitchFamily="2" charset="2"/>
+              <a:buChar char="ü"/>
+            </a:pPr>
+            <a:r>
+              <a:rPr lang="en-US" dirty="0"/>
+              <a:t>Supply reasonable fallback data?</a:t>
+            </a:r>
+          </a:p>
+          <a:p>
+            <a:pPr marL="800033" lvl="1" indent="-342833">
+              <a:spcBef>
+                <a:spcPct val="20000"/>
+              </a:spcBef>
+              <a:buFont typeface="Wingdings" pitchFamily="2" charset="2"/>
+              <a:buChar char="ü"/>
+            </a:pPr>
+            <a:r>
+              <a:rPr lang="en-US" dirty="0"/>
+              <a:t>Ask the user for additional input?</a:t>
+            </a:r>
+          </a:p>
+          <a:p>
+            <a:pPr marL="800033" lvl="1" indent="-342833">
+              <a:spcBef>
+                <a:spcPct val="20000"/>
+              </a:spcBef>
+              <a:buFont typeface="Wingdings" pitchFamily="2" charset="2"/>
+              <a:buChar char="ü"/>
+            </a:pPr>
+            <a:r>
+              <a:rPr lang="en-US" dirty="0"/>
+              <a:t>Choose an alternative execution path?</a:t>
+            </a:r>
+          </a:p>
+          <a:p>
+            <a:pPr marL="342833" indent="-342833">
+              <a:spcBef>
+                <a:spcPct val="20000"/>
+              </a:spcBef>
+              <a:buFont typeface="Wingdings" pitchFamily="2" charset="2"/>
+              <a:buChar char="ü"/>
+            </a:pPr>
+            <a:endParaRPr lang="en-US" dirty="0"/>
+          </a:p>
+          <a:p>
+            <a:pPr marL="342833" indent="-342833">
+              <a:spcBef>
+                <a:spcPct val="20000"/>
+              </a:spcBef>
+              <a:buFont typeface="Wingdings" pitchFamily="2" charset="2"/>
+              <a:buChar char="ü"/>
+            </a:pPr>
+            <a:r>
+              <a:rPr lang="en-US" dirty="0"/>
+              <a:t>The </a:t>
+            </a:r>
+            <a:r>
+              <a:rPr lang="en-US" dirty="0" smtClean="0"/>
+              <a:t>Capability Team must define and document the </a:t>
+            </a:r>
+            <a:r>
+              <a:rPr lang="en-US" dirty="0"/>
+              <a:t>error handling </a:t>
+            </a:r>
+            <a:r>
+              <a:rPr lang="en-US" dirty="0" smtClean="0"/>
+              <a:t>approach.</a:t>
+            </a:r>
+          </a:p>
+          <a:p>
+            <a:pPr marL="342833" indent="-342833">
+              <a:spcBef>
+                <a:spcPct val="20000"/>
+              </a:spcBef>
+              <a:buFont typeface="Wingdings" pitchFamily="2" charset="2"/>
+              <a:buChar char="ü"/>
+            </a:pPr>
+            <a:r>
+              <a:rPr lang="en-US" dirty="0" smtClean="0"/>
+              <a:t>The developers must code and test the approach.</a:t>
+            </a:r>
+            <a:endParaRPr lang="en-US" dirty="0"/>
+          </a:p>
+          <a:p>
+            <a:pPr marL="342833" indent="-342833">
+              <a:spcBef>
+                <a:spcPct val="20000"/>
+              </a:spcBef>
+              <a:buFont typeface="Wingdings" pitchFamily="2" charset="2"/>
+              <a:buChar char="ü"/>
+            </a:pPr>
+            <a:r>
+              <a:rPr lang="en-US" dirty="0"/>
+              <a:t>The </a:t>
+            </a:r>
+            <a:r>
+              <a:rPr lang="en-US" dirty="0" smtClean="0"/>
+              <a:t>Capability Team will review test reports to see that the </a:t>
+            </a:r>
+            <a:r>
+              <a:rPr lang="en-US" dirty="0"/>
+              <a:t>error handling approach is consistent and correct</a:t>
+            </a:r>
+            <a:r>
+              <a:rPr lang="en-US" dirty="0" smtClean="0"/>
+              <a:t>.</a:t>
+            </a:r>
+            <a:endParaRPr lang="en-US" dirty="0"/>
+          </a:p>
+        </p:txBody>
+      </p:sp>
+    </p:spTree>
+    <p:extLst>
+      <p:ext uri="{BB962C8B-B14F-4D97-AF65-F5344CB8AC3E}">
+        <p14:creationId xmlns:p14="http://schemas.microsoft.com/office/powerpoint/2010/main" val="293148061"/>
+      </p:ext>
+    </p:extLst>
+  </p:cSld>
+  <p:clrMapOvr>
+    <a:masterClrMapping/>
+  </p:clrMapOvr>
+  <p:timing>
+    <p:tnLst>
+      <p:par>
+        <p:cTn id="1" dur="indefinite" restart="never" nodeType="tmRoot"/>
+      </p:par>
+    </p:tnLst>
+  </p:timing>
+</p:sld>
+</file>
+
+<file path=ppt/slides/slide15.xml><?xml version="1.0" encoding="utf-8"?>
 <p:sld xmlns:a="http://schemas.openxmlformats.org/drawingml/2006/main" xmlns:r="http://schemas.openxmlformats.org/officeDocument/2006/relationships" xmlns:p="http://schemas.openxmlformats.org/presentationml/2006/main">
   <p:cSld>
     <p:spTree>
@@ -6532,565 +7124,6 @@
 </p:sld>
 </file>
 
-<file path=ppt/slides/slide14.xml><?xml version="1.0" encoding="utf-8"?>
-<p:sld xmlns:a="http://schemas.openxmlformats.org/drawingml/2006/main" xmlns:r="http://schemas.openxmlformats.org/officeDocument/2006/relationships" xmlns:p="http://schemas.openxmlformats.org/presentationml/2006/main">
-  <p:cSld>
-    <p:spTree>
-      <p:nvGrpSpPr>
-        <p:cNvPr id="1" name=""/>
-        <p:cNvGrpSpPr/>
-        <p:nvPr/>
-      </p:nvGrpSpPr>
-      <p:grpSpPr>
-        <a:xfrm>
-          <a:off x="0" y="0"/>
-          <a:ext cx="0" cy="0"/>
-          <a:chOff x="0" y="0"/>
-          <a:chExt cx="0" cy="0"/>
-        </a:xfrm>
-      </p:grpSpPr>
-      <p:sp>
-        <p:nvSpPr>
-          <p:cNvPr id="2" name="Title 1"/>
-          <p:cNvSpPr>
-            <a:spLocks noGrp="1"/>
-          </p:cNvSpPr>
-          <p:nvPr>
-            <p:ph type="title"/>
-          </p:nvPr>
-        </p:nvSpPr>
-        <p:spPr>
-          <a:xfrm>
-            <a:off x="469500" y="141650"/>
-            <a:ext cx="7805256" cy="1325563"/>
-          </a:xfrm>
-        </p:spPr>
-        <p:txBody>
-          <a:bodyPr/>
-          <a:lstStyle/>
-          <a:p>
-            <a:r>
-              <a:rPr lang="en-US" dirty="0" smtClean="0"/>
-              <a:t>Background …</a:t>
-            </a:r>
-            <a:endParaRPr lang="en-US" dirty="0"/>
-          </a:p>
-        </p:txBody>
-      </p:sp>
-      <p:sp>
-        <p:nvSpPr>
-          <p:cNvPr id="17" name="TextBox 16"/>
-          <p:cNvSpPr txBox="1"/>
-          <p:nvPr/>
-        </p:nvSpPr>
-        <p:spPr>
-          <a:xfrm>
-            <a:off x="469500" y="1256831"/>
-            <a:ext cx="4357333" cy="523220"/>
-          </a:xfrm>
-          <a:prstGeom prst="rect">
-            <a:avLst/>
-          </a:prstGeom>
-          <a:noFill/>
-        </p:spPr>
-        <p:txBody>
-          <a:bodyPr wrap="square" rtlCol="0">
-            <a:spAutoFit/>
-          </a:bodyPr>
-          <a:lstStyle/>
-          <a:p>
-            <a:r>
-              <a:rPr lang="en-US" sz="2800" u="sng" dirty="0" smtClean="0"/>
-              <a:t>What’s code coverage?</a:t>
-            </a:r>
-            <a:endParaRPr lang="en-US" sz="2800" u="sng" dirty="0"/>
-          </a:p>
-        </p:txBody>
-      </p:sp>
-      <p:sp>
-        <p:nvSpPr>
-          <p:cNvPr id="14" name="Content Placeholder 2"/>
-          <p:cNvSpPr>
-            <a:spLocks noGrp="1"/>
-          </p:cNvSpPr>
-          <p:nvPr>
-            <p:ph idx="1"/>
-          </p:nvPr>
-        </p:nvSpPr>
-        <p:spPr>
-          <a:xfrm>
-            <a:off x="469501" y="1780051"/>
-            <a:ext cx="11510690" cy="4853224"/>
-          </a:xfrm>
-        </p:spPr>
-        <p:txBody>
-          <a:bodyPr>
-            <a:normAutofit fontScale="92500" lnSpcReduction="10000"/>
-          </a:bodyPr>
-          <a:lstStyle/>
-          <a:p>
-            <a:pPr marL="342833" indent="-342833">
-              <a:spcBef>
-                <a:spcPct val="20000"/>
-              </a:spcBef>
-              <a:buFont typeface="Wingdings" pitchFamily="2" charset="2"/>
-              <a:buChar char="ü"/>
-            </a:pPr>
-            <a:r>
-              <a:rPr lang="en-US" dirty="0"/>
-              <a:t>Code coverage is the percentage of code branches in each subroutine that have been tested. </a:t>
-            </a:r>
-          </a:p>
-          <a:p>
-            <a:pPr marL="800010" lvl="1" indent="-342900">
-              <a:spcBef>
-                <a:spcPct val="20000"/>
-              </a:spcBef>
-            </a:pPr>
-            <a:r>
-              <a:rPr lang="en-US" dirty="0"/>
-              <a:t>Coverage information is highly valuable to </a:t>
-            </a:r>
-            <a:r>
-              <a:rPr lang="en-US" dirty="0" smtClean="0"/>
-              <a:t>an approval authority </a:t>
-            </a:r>
-            <a:r>
-              <a:rPr lang="en-US" dirty="0"/>
-              <a:t>who needs to know if all the parts of the code that will be </a:t>
-            </a:r>
-            <a:r>
-              <a:rPr lang="en-US" dirty="0" smtClean="0"/>
-              <a:t>approved have </a:t>
-            </a:r>
-            <a:r>
-              <a:rPr lang="en-US" dirty="0"/>
-              <a:t>been exercised.</a:t>
-            </a:r>
-          </a:p>
-          <a:p>
-            <a:pPr marL="800010" lvl="1" indent="-342900">
-              <a:spcBef>
-                <a:spcPct val="20000"/>
-              </a:spcBef>
-            </a:pPr>
-            <a:r>
-              <a:rPr lang="en-US" dirty="0" smtClean="0"/>
-              <a:t>100% code coverage is ideal but often unachievable due to resource limitations. </a:t>
-            </a:r>
-          </a:p>
-          <a:p>
-            <a:pPr marL="800010" lvl="1" indent="-342900">
-              <a:spcBef>
-                <a:spcPct val="20000"/>
-              </a:spcBef>
-            </a:pPr>
-            <a:r>
-              <a:rPr lang="en-US" dirty="0" smtClean="0"/>
-              <a:t>Capability team needs to decide what percentage of coverage they will reasonably achieve.</a:t>
-            </a:r>
-            <a:endParaRPr lang="en-US" dirty="0"/>
-          </a:p>
-          <a:p>
-            <a:pPr marL="342833" indent="-342833">
-              <a:spcBef>
-                <a:spcPct val="20000"/>
-              </a:spcBef>
-              <a:buFont typeface="Wingdings" pitchFamily="2" charset="2"/>
-              <a:buChar char="ü"/>
-            </a:pPr>
-            <a:r>
-              <a:rPr lang="en-US" dirty="0" smtClean="0"/>
-              <a:t>A </a:t>
-            </a:r>
-            <a:r>
-              <a:rPr lang="en-US" dirty="0"/>
-              <a:t>knowledgeable human in the loop is needed to fully interpret code coverage. </a:t>
-            </a:r>
-          </a:p>
-          <a:p>
-            <a:pPr marL="799943" lvl="1" indent="-342833">
-              <a:spcBef>
-                <a:spcPct val="20000"/>
-              </a:spcBef>
-            </a:pPr>
-            <a:r>
-              <a:rPr lang="en-US" dirty="0" smtClean="0"/>
-              <a:t>As one example, </a:t>
-            </a:r>
-            <a:r>
-              <a:rPr lang="en-US" dirty="0"/>
-              <a:t>a model may have one code path to read a file and have a test that calls that code. In this case, </a:t>
-            </a:r>
-            <a:r>
-              <a:rPr lang="en-US" dirty="0" smtClean="0"/>
-              <a:t>a test tool would </a:t>
-            </a:r>
-            <a:r>
-              <a:rPr lang="en-US" dirty="0"/>
-              <a:t>report 100% code coverage.</a:t>
-            </a:r>
-          </a:p>
-          <a:p>
-            <a:pPr marL="799943" lvl="1" indent="-342833">
-              <a:spcBef>
-                <a:spcPct val="20000"/>
-              </a:spcBef>
-            </a:pPr>
-            <a:r>
-              <a:rPr lang="en-US" dirty="0"/>
-              <a:t>However, if the file could not be opened, the model is missing code that would handle the error. Adding one new path for error handling will improve this code, but without a new test written for this case, the improved code will show only 50% code coverage. </a:t>
-            </a:r>
-          </a:p>
-          <a:p>
-            <a:pPr marL="799943" lvl="1" indent="-342833">
-              <a:spcBef>
-                <a:spcPct val="20000"/>
-              </a:spcBef>
-            </a:pPr>
-            <a:r>
-              <a:rPr lang="en-US" dirty="0"/>
-              <a:t>In the above example, the revised 50% code coverage is better than the original 100% coverage because </a:t>
-            </a:r>
-            <a:r>
-              <a:rPr lang="en-US" dirty="0" smtClean="0"/>
-              <a:t>the model is doing a better job at error handling.</a:t>
-            </a:r>
-            <a:endParaRPr lang="en-US" dirty="0"/>
-          </a:p>
-          <a:p>
-            <a:pPr marL="457200" lvl="1" indent="0">
-              <a:buNone/>
-            </a:pPr>
-            <a:endParaRPr lang="en-US" dirty="0"/>
-          </a:p>
-        </p:txBody>
-      </p:sp>
-    </p:spTree>
-    <p:extLst>
-      <p:ext uri="{BB962C8B-B14F-4D97-AF65-F5344CB8AC3E}">
-        <p14:creationId xmlns:p14="http://schemas.microsoft.com/office/powerpoint/2010/main" val="2853291134"/>
-      </p:ext>
-    </p:extLst>
-  </p:cSld>
-  <p:clrMapOvr>
-    <a:masterClrMapping/>
-  </p:clrMapOvr>
-  <p:timing>
-    <p:tnLst>
-      <p:par>
-        <p:cTn id="1" dur="indefinite" restart="never" nodeType="tmRoot"/>
-      </p:par>
-    </p:tnLst>
-  </p:timing>
-</p:sld>
-</file>
-
-<file path=ppt/slides/slide15.xml><?xml version="1.0" encoding="utf-8"?>
-<p:sld xmlns:a="http://schemas.openxmlformats.org/drawingml/2006/main" xmlns:r="http://schemas.openxmlformats.org/officeDocument/2006/relationships" xmlns:p="http://schemas.openxmlformats.org/presentationml/2006/main">
-  <p:cSld>
-    <p:spTree>
-      <p:nvGrpSpPr>
-        <p:cNvPr id="1" name=""/>
-        <p:cNvGrpSpPr/>
-        <p:nvPr/>
-      </p:nvGrpSpPr>
-      <p:grpSpPr>
-        <a:xfrm>
-          <a:off x="0" y="0"/>
-          <a:ext cx="0" cy="0"/>
-          <a:chOff x="0" y="0"/>
-          <a:chExt cx="0" cy="0"/>
-        </a:xfrm>
-      </p:grpSpPr>
-      <p:sp>
-        <p:nvSpPr>
-          <p:cNvPr id="2" name="Title 1"/>
-          <p:cNvSpPr>
-            <a:spLocks noGrp="1"/>
-          </p:cNvSpPr>
-          <p:nvPr>
-            <p:ph type="title"/>
-          </p:nvPr>
-        </p:nvSpPr>
-        <p:spPr>
-          <a:xfrm>
-            <a:off x="469500" y="141650"/>
-            <a:ext cx="7805256" cy="1325563"/>
-          </a:xfrm>
-        </p:spPr>
-        <p:txBody>
-          <a:bodyPr/>
-          <a:lstStyle/>
-          <a:p>
-            <a:r>
-              <a:rPr lang="en-US" dirty="0" smtClean="0"/>
-              <a:t>Background …</a:t>
-            </a:r>
-            <a:endParaRPr lang="en-US" dirty="0"/>
-          </a:p>
-        </p:txBody>
-      </p:sp>
-      <p:sp>
-        <p:nvSpPr>
-          <p:cNvPr id="17" name="TextBox 16"/>
-          <p:cNvSpPr txBox="1"/>
-          <p:nvPr/>
-        </p:nvSpPr>
-        <p:spPr>
-          <a:xfrm>
-            <a:off x="469500" y="1256831"/>
-            <a:ext cx="5757129" cy="523220"/>
-          </a:xfrm>
-          <a:prstGeom prst="rect">
-            <a:avLst/>
-          </a:prstGeom>
-          <a:noFill/>
-        </p:spPr>
-        <p:txBody>
-          <a:bodyPr wrap="square" rtlCol="0">
-            <a:spAutoFit/>
-          </a:bodyPr>
-          <a:lstStyle/>
-          <a:p>
-            <a:r>
-              <a:rPr lang="en-US" sz="2800" u="sng" dirty="0" smtClean="0"/>
-              <a:t>Consistent and correct error handling</a:t>
-            </a:r>
-            <a:endParaRPr lang="en-US" sz="2800" u="sng" dirty="0"/>
-          </a:p>
-        </p:txBody>
-      </p:sp>
-      <p:sp>
-        <p:nvSpPr>
-          <p:cNvPr id="14" name="Content Placeholder 2"/>
-          <p:cNvSpPr>
-            <a:spLocks noGrp="1"/>
-          </p:cNvSpPr>
-          <p:nvPr>
-            <p:ph idx="1"/>
-          </p:nvPr>
-        </p:nvSpPr>
-        <p:spPr>
-          <a:xfrm>
-            <a:off x="469501" y="1780051"/>
-            <a:ext cx="11510690" cy="4853224"/>
-          </a:xfrm>
-        </p:spPr>
-        <p:txBody>
-          <a:bodyPr>
-            <a:normAutofit fontScale="92500" lnSpcReduction="20000"/>
-          </a:bodyPr>
-          <a:lstStyle/>
-          <a:p>
-            <a:pPr marL="342833" indent="-342833">
-              <a:spcBef>
-                <a:spcPct val="20000"/>
-              </a:spcBef>
-              <a:buFont typeface="Wingdings" pitchFamily="2" charset="2"/>
-              <a:buChar char="ü"/>
-            </a:pPr>
-            <a:r>
-              <a:rPr lang="en-US" dirty="0"/>
-              <a:t>Both the </a:t>
-            </a:r>
-            <a:r>
-              <a:rPr lang="en-US" dirty="0" smtClean="0"/>
-              <a:t>capability team and the JEL team must </a:t>
-            </a:r>
-            <a:r>
-              <a:rPr lang="en-US" dirty="0"/>
-              <a:t>know a model’s error handling approach and evaluate whether it’s being followed in order to properly judge a code coverage metric.</a:t>
-            </a:r>
-          </a:p>
-          <a:p>
-            <a:pPr marL="342833" indent="-342833">
-              <a:spcBef>
-                <a:spcPct val="20000"/>
-              </a:spcBef>
-              <a:buFont typeface="Wingdings" pitchFamily="2" charset="2"/>
-              <a:buChar char="ü"/>
-            </a:pPr>
-            <a:r>
-              <a:rPr lang="en-US" dirty="0"/>
-              <a:t>For instance, if the model encounters a problem during its execution, does it:</a:t>
-            </a:r>
-          </a:p>
-          <a:p>
-            <a:pPr marL="800033" lvl="1" indent="-342833">
-              <a:spcBef>
-                <a:spcPct val="20000"/>
-              </a:spcBef>
-              <a:buFont typeface="Wingdings" pitchFamily="2" charset="2"/>
-              <a:buChar char="ü"/>
-            </a:pPr>
-            <a:r>
-              <a:rPr lang="en-US" dirty="0"/>
-              <a:t>Issue a warning?</a:t>
-            </a:r>
-          </a:p>
-          <a:p>
-            <a:pPr marL="800033" lvl="1" indent="-342833">
-              <a:spcBef>
-                <a:spcPct val="20000"/>
-              </a:spcBef>
-              <a:buFont typeface="Wingdings" pitchFamily="2" charset="2"/>
-              <a:buChar char="ü"/>
-            </a:pPr>
-            <a:r>
-              <a:rPr lang="en-US" dirty="0"/>
-              <a:t>Fail immediately?</a:t>
-            </a:r>
-          </a:p>
-          <a:p>
-            <a:pPr marL="800033" lvl="1" indent="-342833">
-              <a:spcBef>
-                <a:spcPct val="20000"/>
-              </a:spcBef>
-              <a:buFont typeface="Wingdings" pitchFamily="2" charset="2"/>
-              <a:buChar char="ü"/>
-            </a:pPr>
-            <a:r>
-              <a:rPr lang="en-US" dirty="0"/>
-              <a:t>Rollback to a previous point?</a:t>
-            </a:r>
-          </a:p>
-          <a:p>
-            <a:pPr marL="800033" lvl="1" indent="-342833">
-              <a:spcBef>
-                <a:spcPct val="20000"/>
-              </a:spcBef>
-              <a:buFont typeface="Wingdings" pitchFamily="2" charset="2"/>
-              <a:buChar char="ü"/>
-            </a:pPr>
-            <a:r>
-              <a:rPr lang="en-US" dirty="0"/>
-              <a:t>Supply reasonable fallback data?</a:t>
-            </a:r>
-          </a:p>
-          <a:p>
-            <a:pPr marL="800033" lvl="1" indent="-342833">
-              <a:spcBef>
-                <a:spcPct val="20000"/>
-              </a:spcBef>
-              <a:buFont typeface="Wingdings" pitchFamily="2" charset="2"/>
-              <a:buChar char="ü"/>
-            </a:pPr>
-            <a:r>
-              <a:rPr lang="en-US" dirty="0"/>
-              <a:t>Ask the user for additional input?</a:t>
-            </a:r>
-          </a:p>
-          <a:p>
-            <a:pPr marL="800033" lvl="1" indent="-342833">
-              <a:spcBef>
-                <a:spcPct val="20000"/>
-              </a:spcBef>
-              <a:buFont typeface="Wingdings" pitchFamily="2" charset="2"/>
-              <a:buChar char="ü"/>
-            </a:pPr>
-            <a:r>
-              <a:rPr lang="en-US" dirty="0"/>
-              <a:t>Choose an alternative execution path?</a:t>
-            </a:r>
-          </a:p>
-          <a:p>
-            <a:pPr marL="342833" indent="-342833">
-              <a:spcBef>
-                <a:spcPct val="20000"/>
-              </a:spcBef>
-              <a:buFont typeface="Wingdings" pitchFamily="2" charset="2"/>
-              <a:buChar char="ü"/>
-            </a:pPr>
-            <a:endParaRPr lang="en-US" dirty="0"/>
-          </a:p>
-          <a:p>
-            <a:pPr marL="342833" indent="-342833">
-              <a:spcBef>
-                <a:spcPct val="20000"/>
-              </a:spcBef>
-              <a:buFont typeface="Wingdings" pitchFamily="2" charset="2"/>
-              <a:buChar char="ü"/>
-            </a:pPr>
-            <a:r>
-              <a:rPr lang="en-US" dirty="0"/>
-              <a:t>The </a:t>
-            </a:r>
-            <a:r>
-              <a:rPr lang="en-US" dirty="0" smtClean="0"/>
-              <a:t>Capability Team must define and document the </a:t>
-            </a:r>
-            <a:r>
-              <a:rPr lang="en-US" dirty="0"/>
-              <a:t>error handling </a:t>
-            </a:r>
-            <a:r>
-              <a:rPr lang="en-US" dirty="0" smtClean="0"/>
-              <a:t>approach.</a:t>
-            </a:r>
-          </a:p>
-          <a:p>
-            <a:pPr marL="342833" indent="-342833">
-              <a:spcBef>
-                <a:spcPct val="20000"/>
-              </a:spcBef>
-              <a:buFont typeface="Wingdings" pitchFamily="2" charset="2"/>
-              <a:buChar char="ü"/>
-            </a:pPr>
-            <a:r>
-              <a:rPr lang="en-US" dirty="0" smtClean="0"/>
-              <a:t>The developers must code and test the approach.</a:t>
-            </a:r>
-            <a:endParaRPr lang="en-US" dirty="0"/>
-          </a:p>
-          <a:p>
-            <a:pPr marL="342833" indent="-342833">
-              <a:spcBef>
-                <a:spcPct val="20000"/>
-              </a:spcBef>
-              <a:buFont typeface="Wingdings" pitchFamily="2" charset="2"/>
-              <a:buChar char="ü"/>
-            </a:pPr>
-            <a:r>
-              <a:rPr lang="en-US" dirty="0"/>
-              <a:t>The </a:t>
-            </a:r>
-            <a:r>
-              <a:rPr lang="en-US" dirty="0" smtClean="0"/>
-              <a:t>Capability Team will review test reports to see that the </a:t>
-            </a:r>
-            <a:r>
-              <a:rPr lang="en-US" dirty="0"/>
-              <a:t>error handling approach is consistent and correct</a:t>
-            </a:r>
-            <a:r>
-              <a:rPr lang="en-US" dirty="0" smtClean="0"/>
-              <a:t>.</a:t>
-            </a:r>
-            <a:endParaRPr lang="en-US" dirty="0"/>
-          </a:p>
-        </p:txBody>
-      </p:sp>
-    </p:spTree>
-    <p:extLst>
-      <p:ext uri="{BB962C8B-B14F-4D97-AF65-F5344CB8AC3E}">
-        <p14:creationId xmlns:p14="http://schemas.microsoft.com/office/powerpoint/2010/main" val="293148061"/>
-      </p:ext>
-    </p:extLst>
-  </p:cSld>
-  <p:clrMapOvr>
-    <a:masterClrMapping/>
-  </p:clrMapOvr>
-  <p:timing>
-    <p:tnLst>
-      <p:par>
-        <p:cTn id="1" dur="indefinite" restart="never" nodeType="tmRoot"/>
-      </p:par>
-    </p:tnLst>
-  </p:timing>
-</p:sld>
-</file>
-
 <file path=ppt/slides/slide16.xml><?xml version="1.0" encoding="utf-8"?>
 <p:sld xmlns:a="http://schemas.openxmlformats.org/drawingml/2006/main" xmlns:r="http://schemas.openxmlformats.org/officeDocument/2006/relationships" xmlns:p="http://schemas.openxmlformats.org/presentationml/2006/main">
   <p:cSld>
@@ -7879,21 +7912,18 @@
           <a:lstStyle/>
           <a:p>
             <a:r>
-              <a:rPr lang="en-US" dirty="0" smtClean="0"/>
-              <a:t>Our</a:t>
-            </a:r>
-            <a:r>
               <a:rPr lang="en-US" baseline="0" dirty="0" smtClean="0"/>
-              <a:t> t</a:t>
-            </a:r>
-            <a:r>
-              <a:rPr lang="en-US" dirty="0" smtClean="0"/>
-              <a:t>esting should </a:t>
+              <a:t>What </a:t>
             </a:r>
             <a:r>
               <a:rPr lang="en-US" baseline="0" dirty="0" smtClean="0"/>
-              <a:t>be balanced. What often happens instead:</a:t>
-            </a:r>
+              <a:t>often </a:t>
+            </a:r>
+            <a:r>
+              <a:rPr lang="en-US" baseline="0" dirty="0" smtClean="0"/>
+              <a:t>happens:</a:t>
+            </a:r>
+            <a:endParaRPr lang="en-US" baseline="0" dirty="0" smtClean="0"/>
           </a:p>
           <a:p>
             <a:pPr lvl="1"/>
@@ -7918,7 +7948,15 @@
             </a:r>
             <a:r>
               <a:rPr lang="en-US" dirty="0" smtClean="0"/>
-              <a:t> is largely ignored in favor of system testing.</a:t>
+              <a:t> is largely ignored in favor </a:t>
+            </a:r>
+            <a:r>
+              <a:rPr lang="en-US" dirty="0" smtClean="0"/>
+              <a:t>of a large amount of </a:t>
+            </a:r>
+            <a:r>
+              <a:rPr lang="en-US" dirty="0" smtClean="0"/>
+              <a:t>system testing.</a:t>
             </a:r>
             <a:endParaRPr lang="en-US" baseline="0" dirty="0" smtClean="0"/>
           </a:p>
@@ -7930,55 +7968,65 @@
           </a:p>
           <a:p>
             <a:r>
-              <a:rPr lang="en-US" dirty="0" smtClean="0"/>
-              <a:t>Note that for testing purposes, software d</a:t>
-            </a:r>
-            <a:r>
-              <a:rPr lang="en-US" sz="2800" dirty="0" smtClean="0">
-                <a:effectLst/>
-              </a:rPr>
-              <a:t>esign </a:t>
-            </a:r>
-            <a:r>
-              <a:rPr lang="en-US" sz="2800" baseline="0" dirty="0" smtClean="0">
-                <a:effectLst/>
-              </a:rPr>
-              <a:t>do</a:t>
-            </a:r>
-            <a:r>
-              <a:rPr lang="en-US" dirty="0" smtClean="0"/>
-              <a:t>cumentation -- auto-generated or otherwise -- </a:t>
-            </a:r>
-            <a:r>
-              <a:rPr lang="en-US" sz="2800" baseline="0" dirty="0" smtClean="0">
-                <a:effectLst/>
-              </a:rPr>
-              <a:t>is helpful to avoid direct looks into the code. We want to easily identify expected inputs/outputs</a:t>
-            </a:r>
-            <a:r>
-              <a:rPr lang="en-US" sz="2800" dirty="0" smtClean="0">
-                <a:effectLst/>
-              </a:rPr>
-              <a:t> </a:t>
-            </a:r>
-            <a:r>
-              <a:rPr lang="en-US" sz="2800" baseline="0" dirty="0" smtClean="0">
-                <a:effectLst/>
-              </a:rPr>
-              <a:t>and valid data ranges to generate quality test cases.</a:t>
-            </a:r>
-            <a:r>
-              <a:rPr lang="en-US" sz="2800" baseline="0" dirty="0" smtClean="0">
-                <a:solidFill>
-                  <a:srgbClr val="9900FF"/>
-                </a:solidFill>
-                <a:effectLst/>
-              </a:rPr>
-              <a:t> </a:t>
-            </a:r>
-            <a:endParaRPr lang="en-US" sz="2800" baseline="0" dirty="0" smtClean="0">
-              <a:effectLst/>
-            </a:endParaRPr>
+              <a:rPr lang="en-US" dirty="0"/>
+              <a:t>What </a:t>
+            </a:r>
+            <a:r>
+              <a:rPr lang="en-US" dirty="0" smtClean="0"/>
+              <a:t>works better:</a:t>
+            </a:r>
+            <a:endParaRPr lang="en-US" dirty="0"/>
+          </a:p>
+          <a:p>
+            <a:pPr lvl="1"/>
+            <a:r>
+              <a:rPr lang="en-US" dirty="0"/>
+              <a:t>Developers </a:t>
+            </a:r>
+            <a:r>
+              <a:rPr lang="en-US" dirty="0" smtClean="0"/>
+              <a:t>do smart unit </a:t>
+            </a:r>
+            <a:r>
+              <a:rPr lang="en-US" dirty="0"/>
+              <a:t>testing as they write single </a:t>
+            </a:r>
+            <a:r>
+              <a:rPr lang="en-US" dirty="0" smtClean="0"/>
+              <a:t>functions, using partition/boundary checking.</a:t>
+            </a:r>
+            <a:endParaRPr lang="en-US" dirty="0"/>
+          </a:p>
+          <a:p>
+            <a:pPr lvl="1"/>
+            <a:r>
+              <a:rPr lang="en-US" dirty="0" smtClean="0"/>
+              <a:t>Integration </a:t>
+            </a:r>
+            <a:r>
+              <a:rPr lang="en-US" dirty="0"/>
+              <a:t>testing is </a:t>
+            </a:r>
+            <a:r>
+              <a:rPr lang="en-US" dirty="0" smtClean="0"/>
+              <a:t>introduced in stages, connecting two or more units and testing the interfaces between them.</a:t>
+            </a:r>
+          </a:p>
+          <a:p>
+            <a:pPr lvl="1"/>
+            <a:r>
+              <a:rPr lang="en-US" dirty="0"/>
+              <a:t>System tests </a:t>
+            </a:r>
+            <a:r>
+              <a:rPr lang="en-US" dirty="0" smtClean="0"/>
+              <a:t>are done as the final integrations are made, testing a reduced set of prioritized use cases.</a:t>
+            </a:r>
+            <a:endParaRPr lang="en-US" dirty="0"/>
+          </a:p>
+          <a:p>
+            <a:pPr lvl="1"/>
+            <a:endParaRPr lang="en-US" dirty="0"/>
           </a:p>
         </p:txBody>
       </p:sp>
@@ -8383,15 +8431,7 @@
           <a:p>
             <a:r>
               <a:rPr lang="en-US" dirty="0" smtClean="0"/>
-              <a:t>A “</a:t>
-            </a:r>
-            <a:r>
-              <a:rPr lang="en-US" smtClean="0"/>
-              <a:t>Hello World”-type testing </a:t>
-            </a:r>
-            <a:r>
-              <a:rPr lang="en-US" dirty="0" smtClean="0"/>
-              <a:t>example</a:t>
+              <a:t>Layered testing -- Learning by example</a:t>
             </a:r>
             <a:endParaRPr lang="en-US" dirty="0"/>
           </a:p>
@@ -8461,7 +8501,7 @@
         <p:spPr>
           <a:xfrm>
             <a:off x="6625883" y="3496848"/>
-            <a:ext cx="5450229" cy="2862322"/>
+            <a:ext cx="5450229" cy="3170099"/>
           </a:xfrm>
           <a:prstGeom prst="rect">
             <a:avLst/>
@@ -8476,16 +8516,25 @@
           <a:p>
             <a:r>
               <a:rPr lang="en-US" sz="2000" dirty="0" smtClean="0"/>
-              <a:t>A </a:t>
-            </a:r>
-            <a:r>
-              <a:rPr lang="en-US" sz="2000" i="1" dirty="0" smtClean="0"/>
-              <a:t>very</a:t>
+              <a:t>A simple grading app </a:t>
             </a:r>
             <a:r>
               <a:rPr lang="en-US" sz="2000" dirty="0" smtClean="0"/>
-              <a:t> simple app that still illustrates the need for layered testing methods. </a:t>
-            </a:r>
+              <a:t>that </a:t>
+            </a:r>
+            <a:r>
+              <a:rPr lang="en-US" sz="2000" dirty="0" smtClean="0"/>
+              <a:t>illustrates how layered </a:t>
+            </a:r>
+            <a:r>
+              <a:rPr lang="en-US" sz="2000" dirty="0" smtClean="0"/>
+              <a:t>testing </a:t>
+            </a:r>
+            <a:r>
+              <a:rPr lang="en-US" sz="2000" dirty="0" smtClean="0"/>
+              <a:t>methods work. </a:t>
+            </a:r>
+            <a:endParaRPr lang="en-US" sz="2000" dirty="0" smtClean="0"/>
           </a:p>
           <a:p>
             <a:r>
@@ -8521,8 +8570,19 @@
           <a:p>
             <a:r>
               <a:rPr lang="en-US" sz="2000" dirty="0" smtClean="0"/>
-              <a:t>Of course, users don’t always do the “right” thing!</a:t>
-            </a:r>
+              <a:t>Of course, users don’t always do the “right” thing</a:t>
+            </a:r>
+            <a:r>
+              <a:rPr lang="en-US" sz="2000" dirty="0" smtClean="0"/>
+              <a:t>!</a:t>
+            </a:r>
+          </a:p>
+          <a:p>
+            <a:r>
+              <a:rPr lang="en-US" sz="2000" dirty="0" smtClean="0"/>
+              <a:t>But we can plan ahead …</a:t>
+            </a:r>
+            <a:endParaRPr lang="en-US" sz="2000" dirty="0" smtClean="0"/>
           </a:p>
         </p:txBody>
       </p:sp>
@@ -11732,6 +11792,44 @@
           </a:prstGeom>
         </p:spPr>
       </p:pic>
+      <p:cxnSp>
+        <p:nvCxnSpPr>
+          <p:cNvPr id="5" name="Straight Connector 4"/>
+          <p:cNvCxnSpPr>
+            <a:stCxn id="3" idx="0"/>
+            <a:endCxn id="3" idx="2"/>
+          </p:cNvCxnSpPr>
+          <p:nvPr/>
+        </p:nvCxnSpPr>
+        <p:spPr>
+          <a:xfrm>
+            <a:off x="3310439" y="1120523"/>
+            <a:ext cx="0" cy="5670515"/>
+          </a:xfrm>
+          <a:prstGeom prst="line">
+            <a:avLst/>
+          </a:prstGeom>
+          <a:ln w="47625">
+            <a:solidFill>
+              <a:schemeClr val="tx1"/>
+            </a:solidFill>
+          </a:ln>
+        </p:spPr>
+        <p:style>
+          <a:lnRef idx="1">
+            <a:schemeClr val="accent1"/>
+          </a:lnRef>
+          <a:fillRef idx="0">
+            <a:schemeClr val="accent1"/>
+          </a:fillRef>
+          <a:effectRef idx="0">
+            <a:schemeClr val="accent1"/>
+          </a:effectRef>
+          <a:fontRef idx="minor">
+            <a:schemeClr val="tx1"/>
+          </a:fontRef>
+        </p:style>
+      </p:cxnSp>
     </p:spTree>
     <p:extLst>
       <p:ext uri="{BB962C8B-B14F-4D97-AF65-F5344CB8AC3E}">
@@ -12433,8 +12531,12 @@
           <a:lstStyle/>
           <a:p>
             <a:r>
-              <a:rPr lang="en-US" dirty="0" smtClean="0"/>
-              <a:t>Why more balanced testing?</a:t>
+              <a:rPr lang="en-US" dirty="0"/>
+              <a:t>B</a:t>
+            </a:r>
+            <a:r>
+              <a:rPr lang="en-US" dirty="0" smtClean="0"/>
+              <a:t>alanced testing</a:t>
             </a:r>
             <a:endParaRPr lang="en-US" dirty="0"/>
           </a:p>
@@ -12523,7 +12625,6 @@
               <a:rPr lang="en-US" baseline="0" dirty="0" smtClean="0"/>
               <a:t>.</a:t>
             </a:r>
-            <a:endParaRPr lang="en-US" baseline="0" dirty="0" smtClean="0"/>
           </a:p>
           <a:p>
             <a:pPr lvl="0"/>
@@ -12533,33 +12634,24 @@
             </a:r>
             <a:r>
               <a:rPr lang="en-US" baseline="0" dirty="0" smtClean="0"/>
-              <a:t> </a:t>
+              <a:t> leve</a:t>
+            </a:r>
+            <a:r>
+              <a:rPr lang="en-US" dirty="0" smtClean="0"/>
+              <a:t>ls provides</a:t>
             </a:r>
             <a:r>
               <a:rPr lang="en-US" baseline="0" dirty="0" smtClean="0"/>
-              <a:t>leve</a:t>
-            </a:r>
-            <a:r>
-              <a:rPr lang="en-US" dirty="0" smtClean="0"/>
-              <a:t>ls </a:t>
-            </a:r>
-            <a:r>
-              <a:rPr lang="en-US" dirty="0" smtClean="0"/>
-              <a:t>provides</a:t>
+              <a:t> the needed </a:t>
             </a:r>
             <a:r>
               <a:rPr lang="en-US" baseline="0" dirty="0" smtClean="0"/>
-              <a:t> </a:t>
+              <a:t>test coverage</a:t>
             </a:r>
             <a:r>
               <a:rPr lang="en-US" baseline="0" dirty="0" smtClean="0"/>
-              <a:t>the </a:t>
-            </a:r>
-            <a:r>
-              <a:rPr lang="en-US" baseline="0" dirty="0" smtClean="0"/>
-              <a:t>needed code coverage.</a:t>
-            </a:r>
-            <a:endParaRPr lang="en-US" baseline="0" dirty="0" smtClean="0"/>
+              <a:t>.</a:t>
+            </a:r>
           </a:p>
           <a:p>
             <a:pPr lvl="1"/>
@@ -12705,7 +12797,7 @@
           <a:p>
             <a:r>
               <a:rPr lang="en-US" dirty="0" smtClean="0"/>
-              <a:t>On test coverage</a:t>
+              <a:t>Test coverage</a:t>
             </a:r>
             <a:endParaRPr lang="en-US" dirty="0"/>
           </a:p>
@@ -12741,22 +12833,39 @@
           <a:p>
             <a:pPr lvl="1"/>
             <a:r>
-              <a:rPr lang="en-US" baseline="0" dirty="0" smtClean="0"/>
-              <a:t>Capability team should communicate </a:t>
-            </a:r>
-            <a:r>
-              <a:rPr lang="en-US" baseline="0" dirty="0" smtClean="0">
+              <a:rPr lang="en-US" dirty="0"/>
+              <a:t>JEL will communicate </a:t>
+            </a:r>
+            <a:r>
+              <a:rPr lang="en-US" dirty="0">
                 <a:hlinkClick r:id="rId3" action="ppaction://hlinksldjump"/>
               </a:rPr>
+              <a:t>test coverage</a:t>
+            </a:r>
+            <a:r>
+              <a:rPr lang="en-US" dirty="0"/>
+              <a:t> as primary metric in all test reports. Methods of reporting will look slightly different for each test level, and so would require some collaboration.</a:t>
+            </a:r>
+          </a:p>
+          <a:p>
+            <a:pPr lvl="1"/>
+            <a:r>
+              <a:rPr lang="en-US" baseline="0" dirty="0" smtClean="0"/>
+              <a:t>Capability </a:t>
+            </a:r>
+            <a:r>
+              <a:rPr lang="en-US" baseline="0" dirty="0" smtClean="0"/>
+              <a:t>team should communicate </a:t>
+            </a:r>
+            <a:r>
+              <a:rPr lang="en-US" baseline="0" dirty="0" smtClean="0">
+                <a:hlinkClick r:id="rId4" action="ppaction://hlinksldjump"/>
+              </a:rPr>
               <a:t>desired strength of test coverage</a:t>
             </a:r>
             <a:r>
               <a:rPr lang="en-US" baseline="0" dirty="0" smtClean="0"/>
-              <a:t> and testing priorities for each </a:t>
-            </a:r>
-            <a:r>
-              <a:rPr lang="en-US" baseline="0" dirty="0" smtClean="0"/>
-              <a:t>feature.</a:t>
+              <a:t> and testing priorities for each feature.</a:t>
             </a:r>
             <a:r>
               <a:rPr lang="en-US" dirty="0" smtClean="0"/>
@@ -12764,11 +12873,31 @@
             </a:r>
             <a:r>
               <a:rPr lang="en-US" b="1" baseline="0" dirty="0" smtClean="0"/>
-              <a:t>Common methodology</a:t>
+              <a:t>Common </a:t>
             </a:r>
             <a:r>
               <a:rPr lang="en-US" b="1" dirty="0" smtClean="0"/>
-              <a:t> use cases should have more emphasis than uncommon ones</a:t>
+              <a:t>use </a:t>
+            </a:r>
+            <a:r>
+              <a:rPr lang="en-US" b="1" dirty="0" smtClean="0"/>
+              <a:t>cases </a:t>
+            </a:r>
+            <a:r>
+              <a:rPr lang="en-US" b="1" dirty="0" smtClean="0"/>
+              <a:t>for </a:t>
+            </a:r>
+            <a:r>
+              <a:rPr lang="en-US" b="1" dirty="0"/>
+              <a:t>methodology </a:t>
+            </a:r>
+            <a:r>
+              <a:rPr lang="en-US" b="1" dirty="0" smtClean="0"/>
+              <a:t>should </a:t>
+            </a:r>
+            <a:r>
+              <a:rPr lang="en-US" b="1" dirty="0" smtClean="0"/>
+              <a:t>have more emphasis than uncommon ones</a:t>
             </a:r>
             <a:r>
               <a:rPr lang="en-US" b="1" baseline="0" dirty="0" smtClean="0"/>
@@ -12776,31 +12905,7 @@
             </a:r>
             <a:r>
               <a:rPr lang="en-US" baseline="0" dirty="0" smtClean="0"/>
-              <a:t> This should be </a:t>
-            </a:r>
-            <a:r>
-              <a:rPr lang="en-US" baseline="0" dirty="0" smtClean="0"/>
-              <a:t>a </a:t>
-            </a:r>
-            <a:r>
-              <a:rPr lang="en-US" baseline="0" dirty="0" smtClean="0"/>
-              <a:t>discussion topic.</a:t>
-            </a:r>
-            <a:endParaRPr lang="en-US" baseline="0" dirty="0" smtClean="0"/>
-          </a:p>
-          <a:p>
-            <a:pPr lvl="1"/>
-            <a:r>
-              <a:rPr lang="en-US" dirty="0" smtClean="0"/>
-              <a:t>JEL will communicate test coverage as primary</a:t>
-            </a:r>
-            <a:r>
-              <a:rPr lang="en-US" baseline="0" dirty="0" smtClean="0"/>
-              <a:t> metric in all test reports. Methods of reporting will look slightly different for each test level,</a:t>
-            </a:r>
-            <a:r>
-              <a:rPr lang="en-US" dirty="0" smtClean="0"/>
-              <a:t> and so would require some collaboration.</a:t>
+              <a:t> </a:t>
             </a:r>
           </a:p>
           <a:p>
@@ -12821,8 +12926,8 @@
               <a:t> </a:t>
             </a:r>
             <a:r>
-              <a:rPr lang="en-US" dirty="0" err="1" smtClean="0"/>
-              <a:t>configuraiton</a:t>
+              <a:rPr lang="en-US" dirty="0" smtClean="0"/>
+              <a:t>configuration</a:t>
             </a:r>
             <a:endParaRPr lang="en-US" dirty="0" smtClean="0"/>
           </a:p>
@@ -12838,14 +12943,34 @@
             </a:r>
             <a:r>
               <a:rPr lang="en-US" dirty="0" smtClean="0"/>
-              <a:t> plugin test coverage since we have the source code, many of the underlying libraries are binary-only.</a:t>
+              <a:t> plugin test coverage since we have the source code, many of the underlying libraries are </a:t>
+            </a:r>
+            <a:r>
+              <a:rPr lang="en-US" dirty="0" smtClean="0"/>
+              <a:t>in </a:t>
+            </a:r>
+            <a:r>
+              <a:rPr lang="en-US" dirty="0" smtClean="0"/>
+              <a:t>binary form only</a:t>
+            </a:r>
+            <a:r>
+              <a:rPr lang="en-US" dirty="0" smtClean="0"/>
+              <a:t>.</a:t>
             </a:r>
           </a:p>
           <a:p>
             <a:pPr lvl="1"/>
             <a:r>
               <a:rPr lang="en-US" dirty="0" smtClean="0"/>
-              <a:t>Can we get test coverage reports from the dependent modules?</a:t>
+              <a:t>Can we </a:t>
+            </a:r>
+            <a:r>
+              <a:rPr lang="en-US" dirty="0" smtClean="0"/>
+              <a:t>also get </a:t>
+            </a:r>
+            <a:r>
+              <a:rPr lang="en-US" dirty="0" smtClean="0"/>
+              <a:t>test coverage reports from the dependent modules?</a:t>
             </a:r>
           </a:p>
         </p:txBody>
@@ -12939,20 +13064,20 @@
           <a:p>
             <a:r>
               <a:rPr lang="en-US" dirty="0" smtClean="0"/>
-              <a:t>Capability team </a:t>
-            </a:r>
-            <a:r>
-              <a:rPr lang="en-US" dirty="0" smtClean="0"/>
-              <a:t>needs to focus on </a:t>
+              <a:t>Capability team needs to focus on </a:t>
+            </a:r>
+          </a:p>
+          <a:p>
+            <a:pPr lvl="1"/>
+            <a:r>
+              <a:rPr lang="en-US" dirty="0" smtClean="0"/>
+              <a:t>Evidence of proper design and </a:t>
+            </a:r>
+            <a:r>
+              <a:rPr lang="en-US" dirty="0" smtClean="0"/>
+              <a:t>testing of all modules, if possible.</a:t>
             </a:r>
             <a:endParaRPr lang="en-US" dirty="0" smtClean="0"/>
-          </a:p>
-          <a:p>
-            <a:pPr lvl="1"/>
-            <a:r>
-              <a:rPr lang="en-US" dirty="0" smtClean="0"/>
-              <a:t>Evidence of proper design and testing.</a:t>
-            </a:r>
           </a:p>
           <a:p>
             <a:pPr lvl="1"/>
@@ -12966,11 +13091,7 @@
             </a:r>
             <a:r>
               <a:rPr lang="en-US" dirty="0" smtClean="0"/>
-              <a:t> </a:t>
-            </a:r>
-            <a:r>
-              <a:rPr lang="en-US" dirty="0" smtClean="0"/>
-              <a:t>developers and JEL team.</a:t>
+              <a:t> developers and JEL team.</a:t>
             </a:r>
           </a:p>
           <a:p>
@@ -12980,19 +13101,7 @@
           <a:p>
             <a:r>
               <a:rPr lang="en-US" dirty="0" smtClean="0"/>
-              <a:t>We want to </a:t>
-            </a:r>
-            <a:r>
-              <a:rPr lang="en-US" dirty="0" smtClean="0"/>
-              <a:t>concentrate on including missed </a:t>
-            </a:r>
-            <a:r>
-              <a:rPr lang="en-US" dirty="0" smtClean="0"/>
-              <a:t>tests </a:t>
-            </a:r>
-            <a:r>
-              <a:rPr lang="en-US" dirty="0" smtClean="0"/>
-              <a:t>or </a:t>
+              <a:t>We want to concentrate on including missed tests or </a:t>
             </a:r>
             <a:r>
               <a:rPr lang="en-US" dirty="0"/>
@@ -13000,11 +13109,7 @@
             </a:r>
             <a:r>
               <a:rPr lang="en-US" dirty="0" smtClean="0"/>
-              <a:t>cases at </a:t>
-            </a:r>
-            <a:r>
-              <a:rPr lang="en-US" dirty="0" smtClean="0"/>
-              <a:t>each layer to achieve a balanced testing approach.</a:t>
+              <a:t>cases at each layer to achieve a balanced testing approach.</a:t>
             </a:r>
           </a:p>
           <a:p>
@@ -13050,15 +13155,7 @@
             </a:r>
             <a:r>
               <a:rPr lang="en-US" dirty="0" smtClean="0"/>
-              <a:t>will </a:t>
-            </a:r>
-            <a:r>
-              <a:rPr lang="en-US" dirty="0" smtClean="0"/>
-              <a:t>help improve our priorities and </a:t>
-            </a:r>
-            <a:r>
-              <a:rPr lang="en-US" dirty="0" smtClean="0"/>
-              <a:t>progress.</a:t>
+              <a:t>will help improve our priorities and progress.</a:t>
             </a:r>
             <a:endParaRPr lang="en-US" dirty="0"/>
           </a:p>

</xml_diff>